<commit_message>
New slides, new additions to notebooks
</commit_message>
<xml_diff>
--- a/deep-learning-in-practice-with-pytorch/2-convolutional-neural-networks.pptx
+++ b/deep-learning-in-practice-with-pytorch/2-convolutional-neural-networks.pptx
@@ -7,10 +7,19 @@
   <p:sldIdLst>
     <p:sldId id="257" r:id="rId2"/>
     <p:sldId id="258" r:id="rId3"/>
-    <p:sldId id="259" r:id="rId4"/>
-    <p:sldId id="260" r:id="rId5"/>
-    <p:sldId id="262" r:id="rId6"/>
-    <p:sldId id="261" r:id="rId7"/>
+    <p:sldId id="264" r:id="rId4"/>
+    <p:sldId id="263" r:id="rId5"/>
+    <p:sldId id="265" r:id="rId6"/>
+    <p:sldId id="266" r:id="rId7"/>
+    <p:sldId id="267" r:id="rId8"/>
+    <p:sldId id="268" r:id="rId9"/>
+    <p:sldId id="270" r:id="rId10"/>
+    <p:sldId id="269" r:id="rId11"/>
+    <p:sldId id="259" r:id="rId12"/>
+    <p:sldId id="260" r:id="rId13"/>
+    <p:sldId id="262" r:id="rId14"/>
+    <p:sldId id="261" r:id="rId15"/>
+    <p:sldId id="271" r:id="rId16"/>
   </p:sldIdLst>
   <p:sldSz cx="12192000" cy="6858000"/>
   <p:notesSz cx="6858000" cy="9144000"/>
@@ -1399,16 +1408,7 @@
                 </a:solidFill>
                 <a:latin typeface="+mn-lt"/>
               </a:rPr>
-              <a:t>TITLE OF THE PRESENTATION HERE (MODIFY IN VIEW -&gt; MASK</a:t>
-            </a:r>
-            <a:r>
-              <a:rPr lang="it-IT" sz="1000" baseline="0" dirty="0">
-                <a:solidFill>
-                  <a:srgbClr val="275662"/>
-                </a:solidFill>
-                <a:latin typeface="+mn-lt"/>
-              </a:rPr>
-              <a:t> / AFFICHAGE -&gt; MASQUE DE DIAPOSITIVES) </a:t>
+              <a:t>CONVOLUTIONAL NEURAL NETWORKS</a:t>
             </a:r>
             <a:endParaRPr lang="fr-FR" sz="1000" dirty="0">
               <a:solidFill>
@@ -1907,6 +1907,795 @@
 </p:sld>
 </file>
 
+<file path=ppt/slides/slide10.xml><?xml version="1.0" encoding="utf-8"?>
+<p:sld xmlns:a="http://schemas.openxmlformats.org/drawingml/2006/main" xmlns:r="http://schemas.openxmlformats.org/officeDocument/2006/relationships" xmlns:p="http://schemas.openxmlformats.org/presentationml/2006/main">
+  <p:cSld>
+    <p:spTree>
+      <p:nvGrpSpPr>
+        <p:cNvPr id="1" name=""/>
+        <p:cNvGrpSpPr/>
+        <p:nvPr/>
+      </p:nvGrpSpPr>
+      <p:grpSpPr>
+        <a:xfrm>
+          <a:off x="0" y="0"/>
+          <a:ext cx="0" cy="0"/>
+          <a:chOff x="0" y="0"/>
+          <a:chExt cx="0" cy="0"/>
+        </a:xfrm>
+      </p:grpSpPr>
+      <p:sp>
+        <p:nvSpPr>
+          <p:cNvPr id="2" name="Titre 1">
+            <a:extLst>
+              <a:ext uri="{FF2B5EF4-FFF2-40B4-BE49-F238E27FC236}">
+                <a16:creationId xmlns:a16="http://schemas.microsoft.com/office/drawing/2014/main" id="{252B22A5-27CC-4428-A0CA-44D0C37E6B8E}"/>
+              </a:ext>
+            </a:extLst>
+          </p:cNvPr>
+          <p:cNvSpPr>
+            <a:spLocks noGrp="1"/>
+          </p:cNvSpPr>
+          <p:nvPr>
+            <p:ph type="title"/>
+          </p:nvPr>
+        </p:nvSpPr>
+        <p:spPr/>
+        <p:txBody>
+          <a:bodyPr/>
+          <a:lstStyle/>
+          <a:p>
+            <a:r>
+              <a:rPr lang="en-US" dirty="0"/>
+              <a:t>Architecture</a:t>
+            </a:r>
+          </a:p>
+        </p:txBody>
+      </p:sp>
+      <p:sp>
+        <p:nvSpPr>
+          <p:cNvPr id="3" name="Espace réservé du texte 2">
+            <a:extLst>
+              <a:ext uri="{FF2B5EF4-FFF2-40B4-BE49-F238E27FC236}">
+                <a16:creationId xmlns:a16="http://schemas.microsoft.com/office/drawing/2014/main" id="{AF5CA147-1408-4940-B82B-A33EA4F6C72C}"/>
+              </a:ext>
+            </a:extLst>
+          </p:cNvPr>
+          <p:cNvSpPr>
+            <a:spLocks noGrp="1"/>
+          </p:cNvSpPr>
+          <p:nvPr>
+            <p:ph type="body" sz="quarter" idx="10"/>
+          </p:nvPr>
+        </p:nvSpPr>
+        <p:spPr/>
+        <p:txBody>
+          <a:bodyPr/>
+          <a:lstStyle/>
+          <a:p>
+            <a:r>
+              <a:rPr lang="en-US" dirty="0"/>
+              <a:t>The idea is to create a </a:t>
+            </a:r>
+            <a:r>
+              <a:rPr lang="en-US" i="1" dirty="0"/>
+              <a:t>funnel</a:t>
+            </a:r>
+            <a:r>
+              <a:rPr lang="en-US" dirty="0"/>
+              <a:t> from high dimension to low</a:t>
+            </a:r>
+          </a:p>
+          <a:p>
+            <a:pPr lvl="1"/>
+            <a:r>
+              <a:rPr lang="en-US" dirty="0"/>
+              <a:t>With sequences of convolution/activation/pooling</a:t>
+            </a:r>
+          </a:p>
+          <a:p>
+            <a:pPr lvl="1"/>
+            <a:r>
+              <a:rPr lang="en-US" dirty="0"/>
+              <a:t>And final linear modules for classification or other</a:t>
+            </a:r>
+          </a:p>
+          <a:p>
+            <a:r>
+              <a:rPr lang="en-US" dirty="0"/>
+              <a:t>Real architectures can be quite complex</a:t>
+            </a:r>
+          </a:p>
+        </p:txBody>
+      </p:sp>
+      <p:pic>
+        <p:nvPicPr>
+          <p:cNvPr id="7" name="Image 6">
+            <a:extLst>
+              <a:ext uri="{FF2B5EF4-FFF2-40B4-BE49-F238E27FC236}">
+                <a16:creationId xmlns:a16="http://schemas.microsoft.com/office/drawing/2014/main" id="{E769C328-7755-45A5-8DFD-1E8E0CC9A7B7}"/>
+              </a:ext>
+            </a:extLst>
+          </p:cNvPr>
+          <p:cNvPicPr>
+            <a:picLocks noChangeAspect="1"/>
+          </p:cNvPicPr>
+          <p:nvPr/>
+        </p:nvPicPr>
+        <p:blipFill>
+          <a:blip r:embed="rId2">
+            <a:extLst>
+              <a:ext uri="{28A0092B-C50C-407E-A947-70E740481C1C}">
+                <a14:useLocalDpi xmlns:a14="http://schemas.microsoft.com/office/drawing/2010/main" val="0"/>
+              </a:ext>
+            </a:extLst>
+          </a:blip>
+          <a:stretch>
+            <a:fillRect/>
+          </a:stretch>
+        </p:blipFill>
+        <p:spPr>
+          <a:xfrm>
+            <a:off x="5088118" y="3612298"/>
+            <a:ext cx="6265682" cy="2798345"/>
+          </a:xfrm>
+          <a:prstGeom prst="rect">
+            <a:avLst/>
+          </a:prstGeom>
+        </p:spPr>
+      </p:pic>
+    </p:spTree>
+    <p:extLst>
+      <p:ext uri="{BB962C8B-B14F-4D97-AF65-F5344CB8AC3E}">
+        <p14:creationId xmlns:p14="http://schemas.microsoft.com/office/powerpoint/2010/main" val="1144040383"/>
+      </p:ext>
+    </p:extLst>
+  </p:cSld>
+  <p:clrMapOvr>
+    <a:masterClrMapping/>
+  </p:clrMapOvr>
+</p:sld>
+</file>
+
+<file path=ppt/slides/slide11.xml><?xml version="1.0" encoding="utf-8"?>
+<p:sld xmlns:a="http://schemas.openxmlformats.org/drawingml/2006/main" xmlns:r="http://schemas.openxmlformats.org/officeDocument/2006/relationships" xmlns:p="http://schemas.openxmlformats.org/presentationml/2006/main">
+  <p:cSld>
+    <p:spTree>
+      <p:nvGrpSpPr>
+        <p:cNvPr id="1" name=""/>
+        <p:cNvGrpSpPr/>
+        <p:nvPr/>
+      </p:nvGrpSpPr>
+      <p:grpSpPr>
+        <a:xfrm>
+          <a:off x="0" y="0"/>
+          <a:ext cx="0" cy="0"/>
+          <a:chOff x="0" y="0"/>
+          <a:chExt cx="0" cy="0"/>
+        </a:xfrm>
+      </p:grpSpPr>
+      <p:sp>
+        <p:nvSpPr>
+          <p:cNvPr id="2" name="Titre 1">
+            <a:extLst>
+              <a:ext uri="{FF2B5EF4-FFF2-40B4-BE49-F238E27FC236}">
+                <a16:creationId xmlns:a16="http://schemas.microsoft.com/office/drawing/2014/main" id="{4961A3DA-7478-4005-A9B7-62BC0174F80C}"/>
+              </a:ext>
+            </a:extLst>
+          </p:cNvPr>
+          <p:cNvSpPr>
+            <a:spLocks noGrp="1"/>
+          </p:cNvSpPr>
+          <p:nvPr>
+            <p:ph type="title"/>
+          </p:nvPr>
+        </p:nvSpPr>
+        <p:spPr/>
+        <p:txBody>
+          <a:bodyPr/>
+          <a:lstStyle/>
+          <a:p>
+            <a:r>
+              <a:rPr lang="en-US" dirty="0"/>
+              <a:t>CNNs for image classification</a:t>
+            </a:r>
+          </a:p>
+        </p:txBody>
+      </p:sp>
+      <p:sp>
+        <p:nvSpPr>
+          <p:cNvPr id="3" name="Espace réservé du texte 2">
+            <a:extLst>
+              <a:ext uri="{FF2B5EF4-FFF2-40B4-BE49-F238E27FC236}">
+                <a16:creationId xmlns:a16="http://schemas.microsoft.com/office/drawing/2014/main" id="{D89AF3BF-EF0A-4EE8-8BFC-FD0208C1F07D}"/>
+              </a:ext>
+            </a:extLst>
+          </p:cNvPr>
+          <p:cNvSpPr>
+            <a:spLocks noGrp="1"/>
+          </p:cNvSpPr>
+          <p:nvPr>
+            <p:ph type="body" sz="quarter" idx="10"/>
+          </p:nvPr>
+        </p:nvSpPr>
+        <p:spPr/>
+        <p:txBody>
+          <a:bodyPr/>
+          <a:lstStyle/>
+          <a:p>
+            <a:r>
+              <a:rPr lang="en-US" dirty="0"/>
+              <a:t>The last part of the network is linear modules + activations</a:t>
+            </a:r>
+          </a:p>
+          <a:p>
+            <a:r>
+              <a:rPr lang="en-US" dirty="0"/>
+              <a:t>The output is a tensor with one shape (</a:t>
+            </a:r>
+            <a:r>
+              <a:rPr lang="en-US" dirty="0" err="1"/>
+              <a:t>n_classes</a:t>
+            </a:r>
+            <a:r>
+              <a:rPr lang="en-US" dirty="0"/>
+              <a:t>)</a:t>
+            </a:r>
+          </a:p>
+        </p:txBody>
+      </p:sp>
+      <p:pic>
+        <p:nvPicPr>
+          <p:cNvPr id="5" name="Image 4">
+            <a:extLst>
+              <a:ext uri="{FF2B5EF4-FFF2-40B4-BE49-F238E27FC236}">
+                <a16:creationId xmlns:a16="http://schemas.microsoft.com/office/drawing/2014/main" id="{2AF15676-E6EA-411B-B6D0-E17A82772CC4}"/>
+              </a:ext>
+            </a:extLst>
+          </p:cNvPr>
+          <p:cNvPicPr>
+            <a:picLocks noChangeAspect="1"/>
+          </p:cNvPicPr>
+          <p:nvPr/>
+        </p:nvPicPr>
+        <p:blipFill>
+          <a:blip r:embed="rId2">
+            <a:extLst>
+              <a:ext uri="{28A0092B-C50C-407E-A947-70E740481C1C}">
+                <a14:useLocalDpi xmlns:a14="http://schemas.microsoft.com/office/drawing/2010/main" val="0"/>
+              </a:ext>
+            </a:extLst>
+          </a:blip>
+          <a:stretch>
+            <a:fillRect/>
+          </a:stretch>
+        </p:blipFill>
+        <p:spPr>
+          <a:xfrm>
+            <a:off x="2695575" y="3208943"/>
+            <a:ext cx="6800850" cy="2457450"/>
+          </a:xfrm>
+          <a:prstGeom prst="rect">
+            <a:avLst/>
+          </a:prstGeom>
+        </p:spPr>
+      </p:pic>
+    </p:spTree>
+    <p:extLst>
+      <p:ext uri="{BB962C8B-B14F-4D97-AF65-F5344CB8AC3E}">
+        <p14:creationId xmlns:p14="http://schemas.microsoft.com/office/powerpoint/2010/main" val="3248181531"/>
+      </p:ext>
+    </p:extLst>
+  </p:cSld>
+  <p:clrMapOvr>
+    <a:masterClrMapping/>
+  </p:clrMapOvr>
+</p:sld>
+</file>
+
+<file path=ppt/slides/slide12.xml><?xml version="1.0" encoding="utf-8"?>
+<p:sld xmlns:a="http://schemas.openxmlformats.org/drawingml/2006/main" xmlns:r="http://schemas.openxmlformats.org/officeDocument/2006/relationships" xmlns:p="http://schemas.openxmlformats.org/presentationml/2006/main">
+  <p:cSld>
+    <p:spTree>
+      <p:nvGrpSpPr>
+        <p:cNvPr id="1" name=""/>
+        <p:cNvGrpSpPr/>
+        <p:nvPr/>
+      </p:nvGrpSpPr>
+      <p:grpSpPr>
+        <a:xfrm>
+          <a:off x="0" y="0"/>
+          <a:ext cx="0" cy="0"/>
+          <a:chOff x="0" y="0"/>
+          <a:chExt cx="0" cy="0"/>
+        </a:xfrm>
+      </p:grpSpPr>
+      <p:sp>
+        <p:nvSpPr>
+          <p:cNvPr id="2" name="Titre 1">
+            <a:extLst>
+              <a:ext uri="{FF2B5EF4-FFF2-40B4-BE49-F238E27FC236}">
+                <a16:creationId xmlns:a16="http://schemas.microsoft.com/office/drawing/2014/main" id="{4961A3DA-7478-4005-A9B7-62BC0174F80C}"/>
+              </a:ext>
+            </a:extLst>
+          </p:cNvPr>
+          <p:cNvSpPr>
+            <a:spLocks noGrp="1"/>
+          </p:cNvSpPr>
+          <p:nvPr>
+            <p:ph type="title"/>
+          </p:nvPr>
+        </p:nvSpPr>
+        <p:spPr/>
+        <p:txBody>
+          <a:bodyPr/>
+          <a:lstStyle/>
+          <a:p>
+            <a:r>
+              <a:rPr lang="en-US" dirty="0"/>
+              <a:t>CNNs for image segmentation</a:t>
+            </a:r>
+          </a:p>
+        </p:txBody>
+      </p:sp>
+      <p:sp>
+        <p:nvSpPr>
+          <p:cNvPr id="3" name="Espace réservé du texte 2">
+            <a:extLst>
+              <a:ext uri="{FF2B5EF4-FFF2-40B4-BE49-F238E27FC236}">
+                <a16:creationId xmlns:a16="http://schemas.microsoft.com/office/drawing/2014/main" id="{D89AF3BF-EF0A-4EE8-8BFC-FD0208C1F07D}"/>
+              </a:ext>
+            </a:extLst>
+          </p:cNvPr>
+          <p:cNvSpPr>
+            <a:spLocks noGrp="1"/>
+          </p:cNvSpPr>
+          <p:nvPr>
+            <p:ph type="body" sz="quarter" idx="10"/>
+          </p:nvPr>
+        </p:nvSpPr>
+        <p:spPr/>
+        <p:txBody>
+          <a:bodyPr/>
+          <a:lstStyle/>
+          <a:p>
+            <a:r>
+              <a:rPr lang="en-US" dirty="0"/>
+              <a:t>Different types of segmentation</a:t>
+            </a:r>
+          </a:p>
+          <a:p>
+            <a:pPr lvl="1"/>
+            <a:r>
+              <a:rPr lang="en-US" b="1" dirty="0"/>
+              <a:t>Semantic segmentation</a:t>
+            </a:r>
+            <a:r>
+              <a:rPr lang="en-US" dirty="0"/>
+              <a:t>, associate pixels to classes</a:t>
+            </a:r>
+          </a:p>
+          <a:p>
+            <a:pPr lvl="1"/>
+            <a:r>
+              <a:rPr lang="en-US" b="1" dirty="0"/>
+              <a:t>Instance segmentation</a:t>
+            </a:r>
+            <a:r>
+              <a:rPr lang="en-US" dirty="0"/>
+              <a:t>, associate pixel to object instances</a:t>
+            </a:r>
+          </a:p>
+        </p:txBody>
+      </p:sp>
+      <p:pic>
+        <p:nvPicPr>
+          <p:cNvPr id="5" name="Image 4">
+            <a:extLst>
+              <a:ext uri="{FF2B5EF4-FFF2-40B4-BE49-F238E27FC236}">
+                <a16:creationId xmlns:a16="http://schemas.microsoft.com/office/drawing/2014/main" id="{22F70D04-9F6F-4F84-98D5-422BE848815C}"/>
+              </a:ext>
+            </a:extLst>
+          </p:cNvPr>
+          <p:cNvPicPr>
+            <a:picLocks noChangeAspect="1"/>
+          </p:cNvPicPr>
+          <p:nvPr/>
+        </p:nvPicPr>
+        <p:blipFill>
+          <a:blip r:embed="rId2"/>
+          <a:stretch>
+            <a:fillRect/>
+          </a:stretch>
+        </p:blipFill>
+        <p:spPr>
+          <a:xfrm>
+            <a:off x="4844658" y="3355942"/>
+            <a:ext cx="6385808" cy="2619179"/>
+          </a:xfrm>
+          <a:prstGeom prst="rect">
+            <a:avLst/>
+          </a:prstGeom>
+        </p:spPr>
+      </p:pic>
+    </p:spTree>
+    <p:extLst>
+      <p:ext uri="{BB962C8B-B14F-4D97-AF65-F5344CB8AC3E}">
+        <p14:creationId xmlns:p14="http://schemas.microsoft.com/office/powerpoint/2010/main" val="67506514"/>
+      </p:ext>
+    </p:extLst>
+  </p:cSld>
+  <p:clrMapOvr>
+    <a:masterClrMapping/>
+  </p:clrMapOvr>
+</p:sld>
+</file>
+
+<file path=ppt/slides/slide13.xml><?xml version="1.0" encoding="utf-8"?>
+<p:sld xmlns:a="http://schemas.openxmlformats.org/drawingml/2006/main" xmlns:r="http://schemas.openxmlformats.org/officeDocument/2006/relationships" xmlns:p="http://schemas.openxmlformats.org/presentationml/2006/main">
+  <p:cSld>
+    <p:spTree>
+      <p:nvGrpSpPr>
+        <p:cNvPr id="1" name=""/>
+        <p:cNvGrpSpPr/>
+        <p:nvPr/>
+      </p:nvGrpSpPr>
+      <p:grpSpPr>
+        <a:xfrm>
+          <a:off x="0" y="0"/>
+          <a:ext cx="0" cy="0"/>
+          <a:chOff x="0" y="0"/>
+          <a:chExt cx="0" cy="0"/>
+        </a:xfrm>
+      </p:grpSpPr>
+      <p:sp>
+        <p:nvSpPr>
+          <p:cNvPr id="2" name="Titre 1">
+            <a:extLst>
+              <a:ext uri="{FF2B5EF4-FFF2-40B4-BE49-F238E27FC236}">
+                <a16:creationId xmlns:a16="http://schemas.microsoft.com/office/drawing/2014/main" id="{C86D7B50-8FD2-402E-AD11-1736D480542D}"/>
+              </a:ext>
+            </a:extLst>
+          </p:cNvPr>
+          <p:cNvSpPr>
+            <a:spLocks noGrp="1"/>
+          </p:cNvSpPr>
+          <p:nvPr>
+            <p:ph type="title"/>
+          </p:nvPr>
+        </p:nvSpPr>
+        <p:spPr/>
+        <p:txBody>
+          <a:bodyPr/>
+          <a:lstStyle/>
+          <a:p>
+            <a:r>
+              <a:rPr lang="en-US" dirty="0"/>
+              <a:t>CNNs for non-images?</a:t>
+            </a:r>
+          </a:p>
+        </p:txBody>
+      </p:sp>
+      <p:sp>
+        <p:nvSpPr>
+          <p:cNvPr id="3" name="Espace réservé du texte 2">
+            <a:extLst>
+              <a:ext uri="{FF2B5EF4-FFF2-40B4-BE49-F238E27FC236}">
+                <a16:creationId xmlns:a16="http://schemas.microsoft.com/office/drawing/2014/main" id="{F2BCE95D-3832-484D-BF53-525C3C3853C6}"/>
+              </a:ext>
+            </a:extLst>
+          </p:cNvPr>
+          <p:cNvSpPr>
+            <a:spLocks noGrp="1"/>
+          </p:cNvSpPr>
+          <p:nvPr>
+            <p:ph type="body" sz="quarter" idx="10"/>
+          </p:nvPr>
+        </p:nvSpPr>
+        <p:spPr/>
+        <p:txBody>
+          <a:bodyPr/>
+          <a:lstStyle/>
+          <a:p>
+            <a:r>
+              <a:rPr lang="en-US" dirty="0"/>
+              <a:t>Can you imagine to use the feature construction ability of CNNs to applications that are </a:t>
+            </a:r>
+            <a:r>
+              <a:rPr lang="en-US" i="1" dirty="0"/>
+              <a:t>not </a:t>
+            </a:r>
+            <a:r>
+              <a:rPr lang="en-US" dirty="0"/>
+              <a:t>related to vision?</a:t>
+            </a:r>
+          </a:p>
+        </p:txBody>
+      </p:sp>
+    </p:spTree>
+    <p:extLst>
+      <p:ext uri="{BB962C8B-B14F-4D97-AF65-F5344CB8AC3E}">
+        <p14:creationId xmlns:p14="http://schemas.microsoft.com/office/powerpoint/2010/main" val="4089647688"/>
+      </p:ext>
+    </p:extLst>
+  </p:cSld>
+  <p:clrMapOvr>
+    <a:masterClrMapping/>
+  </p:clrMapOvr>
+</p:sld>
+</file>
+
+<file path=ppt/slides/slide14.xml><?xml version="1.0" encoding="utf-8"?>
+<p:sld xmlns:a="http://schemas.openxmlformats.org/drawingml/2006/main" xmlns:r="http://schemas.openxmlformats.org/officeDocument/2006/relationships" xmlns:p="http://schemas.openxmlformats.org/presentationml/2006/main">
+  <p:cSld>
+    <p:spTree>
+      <p:nvGrpSpPr>
+        <p:cNvPr id="1" name=""/>
+        <p:cNvGrpSpPr/>
+        <p:nvPr/>
+      </p:nvGrpSpPr>
+      <p:grpSpPr>
+        <a:xfrm>
+          <a:off x="0" y="0"/>
+          <a:ext cx="0" cy="0"/>
+          <a:chOff x="0" y="0"/>
+          <a:chExt cx="0" cy="0"/>
+        </a:xfrm>
+      </p:grpSpPr>
+      <p:sp>
+        <p:nvSpPr>
+          <p:cNvPr id="2" name="Titre 1">
+            <a:extLst>
+              <a:ext uri="{FF2B5EF4-FFF2-40B4-BE49-F238E27FC236}">
+                <a16:creationId xmlns:a16="http://schemas.microsoft.com/office/drawing/2014/main" id="{C1DD926E-FAC8-4AD3-9A9E-265980DA1B6B}"/>
+              </a:ext>
+            </a:extLst>
+          </p:cNvPr>
+          <p:cNvSpPr>
+            <a:spLocks noGrp="1"/>
+          </p:cNvSpPr>
+          <p:nvPr>
+            <p:ph type="title"/>
+          </p:nvPr>
+        </p:nvSpPr>
+        <p:spPr/>
+        <p:txBody>
+          <a:bodyPr/>
+          <a:lstStyle/>
+          <a:p>
+            <a:r>
+              <a:rPr lang="en-US" dirty="0"/>
+              <a:t>CNNs for time series analysis</a:t>
+            </a:r>
+          </a:p>
+        </p:txBody>
+      </p:sp>
+      <p:sp>
+        <p:nvSpPr>
+          <p:cNvPr id="3" name="Espace réservé du texte 2">
+            <a:extLst>
+              <a:ext uri="{FF2B5EF4-FFF2-40B4-BE49-F238E27FC236}">
+                <a16:creationId xmlns:a16="http://schemas.microsoft.com/office/drawing/2014/main" id="{A7341B50-8ADE-4F13-85BD-C1FE2833C2DA}"/>
+              </a:ext>
+            </a:extLst>
+          </p:cNvPr>
+          <p:cNvSpPr>
+            <a:spLocks noGrp="1"/>
+          </p:cNvSpPr>
+          <p:nvPr>
+            <p:ph type="body" sz="quarter" idx="10"/>
+          </p:nvPr>
+        </p:nvSpPr>
+        <p:spPr/>
+        <p:txBody>
+          <a:bodyPr/>
+          <a:lstStyle/>
+          <a:p>
+            <a:r>
+              <a:rPr lang="en-US" dirty="0"/>
+              <a:t>But actually, CNN perform </a:t>
+            </a:r>
+            <a:r>
+              <a:rPr lang="en-US" b="1" dirty="0"/>
+              <a:t>automatic feature construction</a:t>
+            </a:r>
+          </a:p>
+          <a:p>
+            <a:r>
+              <a:rPr lang="en-US" dirty="0"/>
+              <a:t>There are alternatives, using expert-designed features</a:t>
+            </a:r>
+          </a:p>
+          <a:p>
+            <a:r>
+              <a:rPr lang="en-US" dirty="0"/>
+              <a:t>For example, python library </a:t>
+            </a:r>
+            <a:r>
+              <a:rPr lang="en-US" b="1" dirty="0" err="1"/>
+              <a:t>tsfresh</a:t>
+            </a:r>
+            <a:endParaRPr lang="en-US" b="1" dirty="0"/>
+          </a:p>
+          <a:p>
+            <a:pPr lvl="1"/>
+            <a:r>
+              <a:rPr lang="en-US" dirty="0"/>
+              <a:t>Transform the dynamic problem into a series of static features</a:t>
+            </a:r>
+          </a:p>
+          <a:p>
+            <a:pPr lvl="1"/>
+            <a:r>
+              <a:rPr lang="en-US" dirty="0"/>
+              <a:t>This is </a:t>
+            </a:r>
+            <a:r>
+              <a:rPr lang="en-US" i="1" dirty="0"/>
+              <a:t>tabular data</a:t>
+            </a:r>
+            <a:r>
+              <a:rPr lang="en-US" dirty="0"/>
+              <a:t>! Apply classic ML algorithms</a:t>
+            </a:r>
+          </a:p>
+          <a:p>
+            <a:pPr lvl="1"/>
+            <a:r>
+              <a:rPr lang="en-US" dirty="0"/>
+              <a:t>(IMHO) Decent for classification, not so much for forecasting</a:t>
+            </a:r>
+          </a:p>
+        </p:txBody>
+      </p:sp>
+    </p:spTree>
+    <p:extLst>
+      <p:ext uri="{BB962C8B-B14F-4D97-AF65-F5344CB8AC3E}">
+        <p14:creationId xmlns:p14="http://schemas.microsoft.com/office/powerpoint/2010/main" val="1691799692"/>
+      </p:ext>
+    </p:extLst>
+  </p:cSld>
+  <p:clrMapOvr>
+    <a:masterClrMapping/>
+  </p:clrMapOvr>
+</p:sld>
+</file>
+
+<file path=ppt/slides/slide15.xml><?xml version="1.0" encoding="utf-8"?>
+<p:sld xmlns:a="http://schemas.openxmlformats.org/drawingml/2006/main" xmlns:r="http://schemas.openxmlformats.org/officeDocument/2006/relationships" xmlns:p="http://schemas.openxmlformats.org/presentationml/2006/main">
+  <p:cSld>
+    <p:spTree>
+      <p:nvGrpSpPr>
+        <p:cNvPr id="1" name=""/>
+        <p:cNvGrpSpPr/>
+        <p:nvPr/>
+      </p:nvGrpSpPr>
+      <p:grpSpPr>
+        <a:xfrm>
+          <a:off x="0" y="0"/>
+          <a:ext cx="0" cy="0"/>
+          <a:chOff x="0" y="0"/>
+          <a:chExt cx="0" cy="0"/>
+        </a:xfrm>
+      </p:grpSpPr>
+      <p:sp>
+        <p:nvSpPr>
+          <p:cNvPr id="2" name="Titre 1">
+            <a:extLst>
+              <a:ext uri="{FF2B5EF4-FFF2-40B4-BE49-F238E27FC236}">
+                <a16:creationId xmlns:a16="http://schemas.microsoft.com/office/drawing/2014/main" id="{8C01C25D-E2AC-434A-898B-2D24C862C33B}"/>
+              </a:ext>
+            </a:extLst>
+          </p:cNvPr>
+          <p:cNvSpPr>
+            <a:spLocks noGrp="1"/>
+          </p:cNvSpPr>
+          <p:nvPr>
+            <p:ph type="title"/>
+          </p:nvPr>
+        </p:nvSpPr>
+        <p:spPr/>
+        <p:txBody>
+          <a:bodyPr/>
+          <a:lstStyle/>
+          <a:p>
+            <a:r>
+              <a:rPr lang="en-US" dirty="0"/>
+              <a:t>Sequences</a:t>
+            </a:r>
+          </a:p>
+        </p:txBody>
+      </p:sp>
+      <p:sp>
+        <p:nvSpPr>
+          <p:cNvPr id="3" name="Espace réservé du texte 2">
+            <a:extLst>
+              <a:ext uri="{FF2B5EF4-FFF2-40B4-BE49-F238E27FC236}">
+                <a16:creationId xmlns:a16="http://schemas.microsoft.com/office/drawing/2014/main" id="{1D9638B2-A8B9-4A1A-AFE7-066B072DF582}"/>
+              </a:ext>
+            </a:extLst>
+          </p:cNvPr>
+          <p:cNvSpPr>
+            <a:spLocks noGrp="1"/>
+          </p:cNvSpPr>
+          <p:nvPr>
+            <p:ph type="body" sz="quarter" idx="10"/>
+          </p:nvPr>
+        </p:nvSpPr>
+        <p:spPr/>
+        <p:txBody>
+          <a:bodyPr/>
+          <a:lstStyle/>
+          <a:p>
+            <a:r>
+              <a:rPr lang="en-US" dirty="0"/>
+              <a:t>In general, every sequence where adjacency has </a:t>
+            </a:r>
+            <a:r>
+              <a:rPr lang="en-US" b="1" dirty="0"/>
+              <a:t>meaning</a:t>
+            </a:r>
+          </a:p>
+          <a:p>
+            <a:pPr lvl="1"/>
+            <a:r>
+              <a:rPr lang="en-US" dirty="0"/>
+              <a:t>DNA/RNA, for example</a:t>
+            </a:r>
+          </a:p>
+          <a:p>
+            <a:pPr lvl="1"/>
+            <a:r>
+              <a:rPr lang="en-US" dirty="0"/>
+              <a:t>Signals coming from spectrometry</a:t>
+            </a:r>
+          </a:p>
+          <a:p>
+            <a:pPr lvl="1"/>
+            <a:r>
+              <a:rPr lang="en-US" dirty="0"/>
+              <a:t>Voxels from 3D scans</a:t>
+            </a:r>
+          </a:p>
+          <a:p>
+            <a:pPr lvl="1"/>
+            <a:r>
+              <a:rPr lang="en-US" dirty="0"/>
+              <a:t>Adjacent nodes in a graph (Convolutional Graph Neural Networks)</a:t>
+            </a:r>
+          </a:p>
+          <a:p>
+            <a:endParaRPr lang="en-US" dirty="0"/>
+          </a:p>
+          <a:p>
+            <a:r>
+              <a:rPr lang="en-US" dirty="0"/>
+              <a:t>The only big difference is the </a:t>
+            </a:r>
+            <a:r>
+              <a:rPr lang="en-US" b="1" dirty="0"/>
+              <a:t>shape</a:t>
+            </a:r>
+            <a:r>
+              <a:rPr lang="en-US" dirty="0"/>
+              <a:t> of convolutional filters</a:t>
+            </a:r>
+          </a:p>
+        </p:txBody>
+      </p:sp>
+    </p:spTree>
+    <p:extLst>
+      <p:ext uri="{BB962C8B-B14F-4D97-AF65-F5344CB8AC3E}">
+        <p14:creationId xmlns:p14="http://schemas.microsoft.com/office/powerpoint/2010/main" val="3203065365"/>
+      </p:ext>
+    </p:extLst>
+  </p:cSld>
+  <p:clrMapOvr>
+    <a:masterClrMapping/>
+  </p:clrMapOvr>
+</p:sld>
+</file>
+
 <file path=ppt/slides/slide2.xml><?xml version="1.0" encoding="utf-8"?>
 <p:sld xmlns:a="http://schemas.openxmlformats.org/drawingml/2006/main" xmlns:r="http://schemas.openxmlformats.org/officeDocument/2006/relationships" xmlns:p="http://schemas.openxmlformats.org/presentationml/2006/main">
   <p:cSld>
@@ -1964,7 +2753,13 @@
           <a:p>
             <a:r>
               <a:rPr lang="it-IT" dirty="0"/>
-              <a:t>What is a Convolutional Neural Network?</a:t>
+              <a:t>Convolution</a:t>
+            </a:r>
+          </a:p>
+          <a:p>
+            <a:r>
+              <a:rPr lang="it-IT" dirty="0"/>
+              <a:t>Max pooling</a:t>
             </a:r>
           </a:p>
           <a:p>
@@ -2022,7 +2817,7 @@
           <p:cNvPr id="2" name="Titre 1">
             <a:extLst>
               <a:ext uri="{FF2B5EF4-FFF2-40B4-BE49-F238E27FC236}">
-                <a16:creationId xmlns:a16="http://schemas.microsoft.com/office/drawing/2014/main" id="{4961A3DA-7478-4005-A9B7-62BC0174F80C}"/>
+                <a16:creationId xmlns:a16="http://schemas.microsoft.com/office/drawing/2014/main" id="{D9DFFC2D-A966-4F78-A7BB-5AF9228C4115}"/>
               </a:ext>
             </a:extLst>
           </p:cNvPr>
@@ -2040,7 +2835,7 @@
           <a:p>
             <a:r>
               <a:rPr lang="en-US" dirty="0"/>
-              <a:t>CNNs for image classification</a:t>
+              <a:t>Convolution</a:t>
             </a:r>
           </a:p>
         </p:txBody>
@@ -2050,7 +2845,7 @@
           <p:cNvPr id="3" name="Espace réservé du texte 2">
             <a:extLst>
               <a:ext uri="{FF2B5EF4-FFF2-40B4-BE49-F238E27FC236}">
-                <a16:creationId xmlns:a16="http://schemas.microsoft.com/office/drawing/2014/main" id="{D89AF3BF-EF0A-4EE8-8BFC-FD0208C1F07D}"/>
+                <a16:creationId xmlns:a16="http://schemas.microsoft.com/office/drawing/2014/main" id="{9401A847-4269-4E24-AC99-840982808DB9}"/>
               </a:ext>
             </a:extLst>
           </p:cNvPr>
@@ -2066,14 +2861,57 @@
           <a:bodyPr/>
           <a:lstStyle/>
           <a:p>
-            <a:endParaRPr lang="en-US"/>
+            <a:r>
+              <a:rPr lang="en-US" dirty="0"/>
+              <a:t>Originally from the domain of </a:t>
+            </a:r>
+            <a:r>
+              <a:rPr lang="en-US" b="1" dirty="0"/>
+              <a:t>computer vision</a:t>
+            </a:r>
           </a:p>
         </p:txBody>
       </p:sp>
+      <p:pic>
+        <p:nvPicPr>
+          <p:cNvPr id="4" name="Image 3">
+            <a:extLst>
+              <a:ext uri="{FF2B5EF4-FFF2-40B4-BE49-F238E27FC236}">
+                <a16:creationId xmlns:a16="http://schemas.microsoft.com/office/drawing/2014/main" id="{8C7BD681-E6F4-4CB4-ABCA-1F85C52DD4EB}"/>
+              </a:ext>
+            </a:extLst>
+          </p:cNvPr>
+          <p:cNvPicPr>
+            <a:picLocks noChangeAspect="1"/>
+          </p:cNvPicPr>
+          <p:nvPr/>
+        </p:nvPicPr>
+        <p:blipFill>
+          <a:blip r:embed="rId2">
+            <a:extLst>
+              <a:ext uri="{28A0092B-C50C-407E-A947-70E740481C1C}">
+                <a14:useLocalDpi xmlns:a14="http://schemas.microsoft.com/office/drawing/2010/main" val="0"/>
+              </a:ext>
+            </a:extLst>
+          </a:blip>
+          <a:stretch>
+            <a:fillRect/>
+          </a:stretch>
+        </p:blipFill>
+        <p:spPr>
+          <a:xfrm>
+            <a:off x="3874418" y="1998019"/>
+            <a:ext cx="6821470" cy="4206096"/>
+          </a:xfrm>
+          <a:prstGeom prst="rect">
+            <a:avLst/>
+          </a:prstGeom>
+        </p:spPr>
+      </p:pic>
     </p:spTree>
     <p:extLst>
       <p:ext uri="{BB962C8B-B14F-4D97-AF65-F5344CB8AC3E}">
-        <p14:creationId xmlns:p14="http://schemas.microsoft.com/office/powerpoint/2010/main" val="3248181531"/>
+        <p14:creationId xmlns:p14="http://schemas.microsoft.com/office/powerpoint/2010/main" val="3922172502"/>
       </p:ext>
     </p:extLst>
   </p:cSld>
@@ -2105,7 +2943,7 @@
           <p:cNvPr id="2" name="Titre 1">
             <a:extLst>
               <a:ext uri="{FF2B5EF4-FFF2-40B4-BE49-F238E27FC236}">
-                <a16:creationId xmlns:a16="http://schemas.microsoft.com/office/drawing/2014/main" id="{4961A3DA-7478-4005-A9B7-62BC0174F80C}"/>
+                <a16:creationId xmlns:a16="http://schemas.microsoft.com/office/drawing/2014/main" id="{FBCBD904-02F9-4850-B4CB-56A98DE976E9}"/>
               </a:ext>
             </a:extLst>
           </p:cNvPr>
@@ -2123,7 +2961,7 @@
           <a:p>
             <a:r>
               <a:rPr lang="en-US" dirty="0"/>
-              <a:t>CNNs for image segmentation</a:t>
+              <a:t>Convolution</a:t>
             </a:r>
           </a:p>
         </p:txBody>
@@ -2133,7 +2971,7 @@
           <p:cNvPr id="3" name="Espace réservé du texte 2">
             <a:extLst>
               <a:ext uri="{FF2B5EF4-FFF2-40B4-BE49-F238E27FC236}">
-                <a16:creationId xmlns:a16="http://schemas.microsoft.com/office/drawing/2014/main" id="{D89AF3BF-EF0A-4EE8-8BFC-FD0208C1F07D}"/>
+                <a16:creationId xmlns:a16="http://schemas.microsoft.com/office/drawing/2014/main" id="{5FD41FF9-4915-40C2-AFFD-1CDFA6009830}"/>
               </a:ext>
             </a:extLst>
           </p:cNvPr>
@@ -2149,14 +2987,79 @@
           <a:bodyPr/>
           <a:lstStyle/>
           <a:p>
-            <a:endParaRPr lang="en-US"/>
+            <a:r>
+              <a:rPr lang="en-US" dirty="0"/>
+              <a:t>Before Deep Learning, considerations from computer vision</a:t>
+            </a:r>
+          </a:p>
+          <a:p>
+            <a:pPr lvl="1"/>
+            <a:r>
+              <a:rPr lang="en-US" dirty="0"/>
+              <a:t>Considering an image as a grid of pixels is missing </a:t>
+            </a:r>
+            <a:r>
+              <a:rPr lang="en-US" b="1" dirty="0"/>
+              <a:t>semantics</a:t>
+            </a:r>
+          </a:p>
+          <a:p>
+            <a:pPr lvl="1"/>
+            <a:r>
+              <a:rPr lang="en-US" dirty="0"/>
+              <a:t>If a pixel is considered a feature, it’s not informative</a:t>
+            </a:r>
+          </a:p>
+          <a:p>
+            <a:pPr lvl="1"/>
+            <a:r>
+              <a:rPr lang="en-US" dirty="0"/>
+              <a:t>Too tied to its absolute position, </a:t>
+            </a:r>
+            <a:r>
+              <a:rPr lang="en-US" b="1" dirty="0"/>
+              <a:t>relative position</a:t>
+            </a:r>
+            <a:r>
+              <a:rPr lang="en-US" dirty="0"/>
+              <a:t> matters more</a:t>
+            </a:r>
           </a:p>
         </p:txBody>
       </p:sp>
+      <p:pic>
+        <p:nvPicPr>
+          <p:cNvPr id="7" name="Image 6">
+            <a:extLst>
+              <a:ext uri="{FF2B5EF4-FFF2-40B4-BE49-F238E27FC236}">
+                <a16:creationId xmlns:a16="http://schemas.microsoft.com/office/drawing/2014/main" id="{BC863295-4129-47C3-80F6-181000A7E962}"/>
+              </a:ext>
+            </a:extLst>
+          </p:cNvPr>
+          <p:cNvPicPr>
+            <a:picLocks noChangeAspect="1"/>
+          </p:cNvPicPr>
+          <p:nvPr/>
+        </p:nvPicPr>
+        <p:blipFill rotWithShape="1">
+          <a:blip r:embed="rId2"/>
+          <a:srcRect l="635"/>
+          <a:stretch/>
+        </p:blipFill>
+        <p:spPr>
+          <a:xfrm>
+            <a:off x="2582944" y="3507334"/>
+            <a:ext cx="8845483" cy="2550778"/>
+          </a:xfrm>
+          <a:prstGeom prst="rect">
+            <a:avLst/>
+          </a:prstGeom>
+        </p:spPr>
+      </p:pic>
     </p:spTree>
     <p:extLst>
       <p:ext uri="{BB962C8B-B14F-4D97-AF65-F5344CB8AC3E}">
-        <p14:creationId xmlns:p14="http://schemas.microsoft.com/office/powerpoint/2010/main" val="67506514"/>
+        <p14:creationId xmlns:p14="http://schemas.microsoft.com/office/powerpoint/2010/main" val="312846748"/>
       </p:ext>
     </p:extLst>
   </p:cSld>
@@ -2183,12 +3086,48 @@
           <a:chExt cx="0" cy="0"/>
         </a:xfrm>
       </p:grpSpPr>
+      <p:pic>
+        <p:nvPicPr>
+          <p:cNvPr id="5" name="Image 4">
+            <a:extLst>
+              <a:ext uri="{FF2B5EF4-FFF2-40B4-BE49-F238E27FC236}">
+                <a16:creationId xmlns:a16="http://schemas.microsoft.com/office/drawing/2014/main" id="{ECCE9600-A82B-462F-AD5C-1D1CD279C50B}"/>
+              </a:ext>
+            </a:extLst>
+          </p:cNvPr>
+          <p:cNvPicPr>
+            <a:picLocks noChangeAspect="1"/>
+          </p:cNvPicPr>
+          <p:nvPr/>
+        </p:nvPicPr>
+        <p:blipFill>
+          <a:blip r:embed="rId2">
+            <a:extLst>
+              <a:ext uri="{28A0092B-C50C-407E-A947-70E740481C1C}">
+                <a14:useLocalDpi xmlns:a14="http://schemas.microsoft.com/office/drawing/2010/main" val="0"/>
+              </a:ext>
+            </a:extLst>
+          </a:blip>
+          <a:stretch>
+            <a:fillRect/>
+          </a:stretch>
+        </p:blipFill>
+        <p:spPr>
+          <a:xfrm>
+            <a:off x="6759018" y="3283100"/>
+            <a:ext cx="4396721" cy="3209774"/>
+          </a:xfrm>
+          <a:prstGeom prst="rect">
+            <a:avLst/>
+          </a:prstGeom>
+        </p:spPr>
+      </p:pic>
       <p:sp>
         <p:nvSpPr>
           <p:cNvPr id="2" name="Titre 1">
             <a:extLst>
               <a:ext uri="{FF2B5EF4-FFF2-40B4-BE49-F238E27FC236}">
-                <a16:creationId xmlns:a16="http://schemas.microsoft.com/office/drawing/2014/main" id="{C86D7B50-8FD2-402E-AD11-1736D480542D}"/>
+                <a16:creationId xmlns:a16="http://schemas.microsoft.com/office/drawing/2014/main" id="{22275A00-FAE4-45E2-B969-5974CDA77333}"/>
               </a:ext>
             </a:extLst>
           </p:cNvPr>
@@ -2206,7 +3145,7 @@
           <a:p>
             <a:r>
               <a:rPr lang="en-US" dirty="0"/>
-              <a:t>CNNs for non-images?</a:t>
+              <a:t>Convolution</a:t>
             </a:r>
           </a:p>
         </p:txBody>
@@ -2216,7 +3155,7 @@
           <p:cNvPr id="3" name="Espace réservé du texte 2">
             <a:extLst>
               <a:ext uri="{FF2B5EF4-FFF2-40B4-BE49-F238E27FC236}">
-                <a16:creationId xmlns:a16="http://schemas.microsoft.com/office/drawing/2014/main" id="{F2BCE95D-3832-484D-BF53-525C3C3853C6}"/>
+                <a16:creationId xmlns:a16="http://schemas.microsoft.com/office/drawing/2014/main" id="{FEDACE9B-5858-4079-8D5C-3AF5A7B14B5F}"/>
               </a:ext>
             </a:extLst>
           </p:cNvPr>
@@ -2232,14 +3171,638 @@
           <a:bodyPr/>
           <a:lstStyle/>
           <a:p>
-            <a:endParaRPr lang="en-US"/>
+            <a:r>
+              <a:rPr lang="en-US" dirty="0"/>
+              <a:t>Convolutional filters</a:t>
+            </a:r>
+          </a:p>
+          <a:p>
+            <a:pPr lvl="1"/>
+            <a:r>
+              <a:rPr lang="en-US" dirty="0"/>
+              <a:t>Small set of weights that are applied to the whole input image</a:t>
+            </a:r>
+          </a:p>
+          <a:p>
+            <a:pPr lvl="1"/>
+            <a:r>
+              <a:rPr lang="en-US" dirty="0"/>
+              <a:t>“Sliding window”, same operation on different groups of pixels</a:t>
+            </a:r>
+          </a:p>
+          <a:p>
+            <a:pPr lvl="1"/>
+            <a:r>
+              <a:rPr lang="en-US" dirty="0"/>
+              <a:t>Output: a tensor more or less of the same size</a:t>
+            </a:r>
+          </a:p>
+        </p:txBody>
+      </p:sp>
+      <p:graphicFrame>
+        <p:nvGraphicFramePr>
+          <p:cNvPr id="6" name="Tableau 6">
+            <a:extLst>
+              <a:ext uri="{FF2B5EF4-FFF2-40B4-BE49-F238E27FC236}">
+                <a16:creationId xmlns:a16="http://schemas.microsoft.com/office/drawing/2014/main" id="{BF354955-835A-41C3-BEC6-6FD23E84CB7D}"/>
+              </a:ext>
+            </a:extLst>
+          </p:cNvPr>
+          <p:cNvGraphicFramePr>
+            <a:graphicFrameLocks noGrp="1"/>
+          </p:cNvGraphicFramePr>
+          <p:nvPr>
+            <p:extLst>
+              <p:ext uri="{D42A27DB-BD31-4B8C-83A1-F6EECF244321}">
+                <p14:modId xmlns:p14="http://schemas.microsoft.com/office/powerpoint/2010/main" val="4192273477"/>
+              </p:ext>
+            </p:extLst>
+          </p:nvPr>
+        </p:nvGraphicFramePr>
+        <p:xfrm>
+          <a:off x="3731967" y="3827253"/>
+          <a:ext cx="1229676" cy="1371600"/>
+        </p:xfrm>
+        <a:graphic>
+          <a:graphicData uri="http://schemas.openxmlformats.org/drawingml/2006/table">
+            <a:tbl>
+              <a:tblPr firstRow="1" bandRow="1">
+                <a:tableStyleId>{C4B1156A-380E-4F78-BDF5-A606A8083BF9}</a:tableStyleId>
+              </a:tblPr>
+              <a:tblGrid>
+                <a:gridCol w="428941">
+                  <a:extLst>
+                    <a:ext uri="{9D8B030D-6E8A-4147-A177-3AD203B41FA5}">
+                      <a16:colId xmlns:a16="http://schemas.microsoft.com/office/drawing/2014/main" val="3058201430"/>
+                    </a:ext>
+                  </a:extLst>
+                </a:gridCol>
+                <a:gridCol w="428941">
+                  <a:extLst>
+                    <a:ext uri="{9D8B030D-6E8A-4147-A177-3AD203B41FA5}">
+                      <a16:colId xmlns:a16="http://schemas.microsoft.com/office/drawing/2014/main" val="3591042072"/>
+                    </a:ext>
+                  </a:extLst>
+                </a:gridCol>
+                <a:gridCol w="371794">
+                  <a:extLst>
+                    <a:ext uri="{9D8B030D-6E8A-4147-A177-3AD203B41FA5}">
+                      <a16:colId xmlns:a16="http://schemas.microsoft.com/office/drawing/2014/main" val="2135636566"/>
+                    </a:ext>
+                  </a:extLst>
+                </a:gridCol>
+              </a:tblGrid>
+              <a:tr h="370840">
+                <a:tc>
+                  <a:txBody>
+                    <a:bodyPr/>
+                    <a:lstStyle/>
+                    <a:p>
+                      <a:pPr algn="ctr"/>
+                      <a:r>
+                        <a:rPr lang="en-US" sz="2400" b="0" dirty="0"/>
+                        <a:t>1</a:t>
+                      </a:r>
+                    </a:p>
+                  </a:txBody>
+                  <a:tcPr>
+                    <a:lnL w="12700" cap="flat" cmpd="sng" algn="ctr">
+                      <a:solidFill>
+                        <a:schemeClr val="tx1"/>
+                      </a:solidFill>
+                      <a:prstDash val="solid"/>
+                      <a:round/>
+                      <a:headEnd type="none" w="med" len="med"/>
+                      <a:tailEnd type="none" w="med" len="med"/>
+                    </a:lnL>
+                    <a:lnR w="12700" cap="flat" cmpd="sng" algn="ctr">
+                      <a:solidFill>
+                        <a:schemeClr val="tx1"/>
+                      </a:solidFill>
+                      <a:prstDash val="solid"/>
+                      <a:round/>
+                      <a:headEnd type="none" w="med" len="med"/>
+                      <a:tailEnd type="none" w="med" len="med"/>
+                    </a:lnR>
+                    <a:lnT w="12700" cap="flat" cmpd="sng" algn="ctr">
+                      <a:solidFill>
+                        <a:schemeClr val="tx1"/>
+                      </a:solidFill>
+                      <a:prstDash val="solid"/>
+                      <a:round/>
+                      <a:headEnd type="none" w="med" len="med"/>
+                      <a:tailEnd type="none" w="med" len="med"/>
+                    </a:lnT>
+                    <a:lnB w="12700" cap="flat" cmpd="sng" algn="ctr">
+                      <a:solidFill>
+                        <a:schemeClr val="tx1"/>
+                      </a:solidFill>
+                      <a:prstDash val="solid"/>
+                      <a:round/>
+                      <a:headEnd type="none" w="med" len="med"/>
+                      <a:tailEnd type="none" w="med" len="med"/>
+                    </a:lnB>
+                    <a:solidFill>
+                      <a:schemeClr val="accent4"/>
+                    </a:solidFill>
+                  </a:tcPr>
+                </a:tc>
+                <a:tc>
+                  <a:txBody>
+                    <a:bodyPr/>
+                    <a:lstStyle/>
+                    <a:p>
+                      <a:pPr algn="ctr"/>
+                      <a:r>
+                        <a:rPr lang="en-US" sz="2400" b="0" dirty="0"/>
+                        <a:t>0</a:t>
+                      </a:r>
+                    </a:p>
+                  </a:txBody>
+                  <a:tcPr>
+                    <a:lnL w="12700" cap="flat" cmpd="sng" algn="ctr">
+                      <a:solidFill>
+                        <a:schemeClr val="tx1"/>
+                      </a:solidFill>
+                      <a:prstDash val="solid"/>
+                      <a:round/>
+                      <a:headEnd type="none" w="med" len="med"/>
+                      <a:tailEnd type="none" w="med" len="med"/>
+                    </a:lnL>
+                    <a:lnR w="12700" cap="flat" cmpd="sng" algn="ctr">
+                      <a:solidFill>
+                        <a:schemeClr val="tx1"/>
+                      </a:solidFill>
+                      <a:prstDash val="solid"/>
+                      <a:round/>
+                      <a:headEnd type="none" w="med" len="med"/>
+                      <a:tailEnd type="none" w="med" len="med"/>
+                    </a:lnR>
+                    <a:lnT w="12700" cap="flat" cmpd="sng" algn="ctr">
+                      <a:solidFill>
+                        <a:schemeClr val="tx1"/>
+                      </a:solidFill>
+                      <a:prstDash val="solid"/>
+                      <a:round/>
+                      <a:headEnd type="none" w="med" len="med"/>
+                      <a:tailEnd type="none" w="med" len="med"/>
+                    </a:lnT>
+                    <a:lnB w="12700" cap="flat" cmpd="sng" algn="ctr">
+                      <a:solidFill>
+                        <a:schemeClr val="tx1"/>
+                      </a:solidFill>
+                      <a:prstDash val="solid"/>
+                      <a:round/>
+                      <a:headEnd type="none" w="med" len="med"/>
+                      <a:tailEnd type="none" w="med" len="med"/>
+                    </a:lnB>
+                    <a:solidFill>
+                      <a:schemeClr val="accent4"/>
+                    </a:solidFill>
+                  </a:tcPr>
+                </a:tc>
+                <a:tc>
+                  <a:txBody>
+                    <a:bodyPr/>
+                    <a:lstStyle/>
+                    <a:p>
+                      <a:pPr algn="ctr"/>
+                      <a:r>
+                        <a:rPr lang="en-US" sz="2400" b="0" dirty="0"/>
+                        <a:t>1</a:t>
+                      </a:r>
+                    </a:p>
+                  </a:txBody>
+                  <a:tcPr>
+                    <a:lnL w="12700" cap="flat" cmpd="sng" algn="ctr">
+                      <a:solidFill>
+                        <a:schemeClr val="tx1"/>
+                      </a:solidFill>
+                      <a:prstDash val="solid"/>
+                      <a:round/>
+                      <a:headEnd type="none" w="med" len="med"/>
+                      <a:tailEnd type="none" w="med" len="med"/>
+                    </a:lnL>
+                    <a:lnR w="12700" cap="flat" cmpd="sng" algn="ctr">
+                      <a:solidFill>
+                        <a:schemeClr val="tx1"/>
+                      </a:solidFill>
+                      <a:prstDash val="solid"/>
+                      <a:round/>
+                      <a:headEnd type="none" w="med" len="med"/>
+                      <a:tailEnd type="none" w="med" len="med"/>
+                    </a:lnR>
+                    <a:lnT w="12700" cap="flat" cmpd="sng" algn="ctr">
+                      <a:solidFill>
+                        <a:schemeClr val="tx1"/>
+                      </a:solidFill>
+                      <a:prstDash val="solid"/>
+                      <a:round/>
+                      <a:headEnd type="none" w="med" len="med"/>
+                      <a:tailEnd type="none" w="med" len="med"/>
+                    </a:lnT>
+                    <a:lnB w="12700" cap="flat" cmpd="sng" algn="ctr">
+                      <a:solidFill>
+                        <a:schemeClr val="tx1"/>
+                      </a:solidFill>
+                      <a:prstDash val="solid"/>
+                      <a:round/>
+                      <a:headEnd type="none" w="med" len="med"/>
+                      <a:tailEnd type="none" w="med" len="med"/>
+                    </a:lnB>
+                    <a:solidFill>
+                      <a:schemeClr val="accent4"/>
+                    </a:solidFill>
+                  </a:tcPr>
+                </a:tc>
+                <a:extLst>
+                  <a:ext uri="{0D108BD9-81ED-4DB2-BD59-A6C34878D82A}">
+                    <a16:rowId xmlns:a16="http://schemas.microsoft.com/office/drawing/2014/main" val="1122974679"/>
+                  </a:ext>
+                </a:extLst>
+              </a:tr>
+              <a:tr h="370840">
+                <a:tc>
+                  <a:txBody>
+                    <a:bodyPr/>
+                    <a:lstStyle/>
+                    <a:p>
+                      <a:pPr algn="ctr"/>
+                      <a:r>
+                        <a:rPr lang="en-US" sz="2400" dirty="0"/>
+                        <a:t>0</a:t>
+                      </a:r>
+                    </a:p>
+                  </a:txBody>
+                  <a:tcPr>
+                    <a:lnL w="12700" cap="flat" cmpd="sng" algn="ctr">
+                      <a:solidFill>
+                        <a:schemeClr val="tx1"/>
+                      </a:solidFill>
+                      <a:prstDash val="solid"/>
+                      <a:round/>
+                      <a:headEnd type="none" w="med" len="med"/>
+                      <a:tailEnd type="none" w="med" len="med"/>
+                    </a:lnL>
+                    <a:lnR w="12700" cap="flat" cmpd="sng" algn="ctr">
+                      <a:solidFill>
+                        <a:schemeClr val="tx1"/>
+                      </a:solidFill>
+                      <a:prstDash val="solid"/>
+                      <a:round/>
+                      <a:headEnd type="none" w="med" len="med"/>
+                      <a:tailEnd type="none" w="med" len="med"/>
+                    </a:lnR>
+                    <a:lnT w="12700" cap="flat" cmpd="sng" algn="ctr">
+                      <a:solidFill>
+                        <a:schemeClr val="tx1"/>
+                      </a:solidFill>
+                      <a:prstDash val="solid"/>
+                      <a:round/>
+                      <a:headEnd type="none" w="med" len="med"/>
+                      <a:tailEnd type="none" w="med" len="med"/>
+                    </a:lnT>
+                    <a:lnB w="12700" cap="flat" cmpd="sng" algn="ctr">
+                      <a:solidFill>
+                        <a:schemeClr val="tx1"/>
+                      </a:solidFill>
+                      <a:prstDash val="solid"/>
+                      <a:round/>
+                      <a:headEnd type="none" w="med" len="med"/>
+                      <a:tailEnd type="none" w="med" len="med"/>
+                    </a:lnB>
+                    <a:solidFill>
+                      <a:schemeClr val="accent4"/>
+                    </a:solidFill>
+                  </a:tcPr>
+                </a:tc>
+                <a:tc>
+                  <a:txBody>
+                    <a:bodyPr/>
+                    <a:lstStyle/>
+                    <a:p>
+                      <a:pPr algn="ctr"/>
+                      <a:r>
+                        <a:rPr lang="en-US" sz="2400" dirty="0"/>
+                        <a:t>1</a:t>
+                      </a:r>
+                    </a:p>
+                  </a:txBody>
+                  <a:tcPr>
+                    <a:lnL w="12700" cap="flat" cmpd="sng" algn="ctr">
+                      <a:solidFill>
+                        <a:schemeClr val="tx1"/>
+                      </a:solidFill>
+                      <a:prstDash val="solid"/>
+                      <a:round/>
+                      <a:headEnd type="none" w="med" len="med"/>
+                      <a:tailEnd type="none" w="med" len="med"/>
+                    </a:lnL>
+                    <a:lnR w="12700" cap="flat" cmpd="sng" algn="ctr">
+                      <a:solidFill>
+                        <a:schemeClr val="tx1"/>
+                      </a:solidFill>
+                      <a:prstDash val="solid"/>
+                      <a:round/>
+                      <a:headEnd type="none" w="med" len="med"/>
+                      <a:tailEnd type="none" w="med" len="med"/>
+                    </a:lnR>
+                    <a:lnT w="12700" cap="flat" cmpd="sng" algn="ctr">
+                      <a:solidFill>
+                        <a:schemeClr val="tx1"/>
+                      </a:solidFill>
+                      <a:prstDash val="solid"/>
+                      <a:round/>
+                      <a:headEnd type="none" w="med" len="med"/>
+                      <a:tailEnd type="none" w="med" len="med"/>
+                    </a:lnT>
+                    <a:lnB w="12700" cap="flat" cmpd="sng" algn="ctr">
+                      <a:solidFill>
+                        <a:schemeClr val="tx1"/>
+                      </a:solidFill>
+                      <a:prstDash val="solid"/>
+                      <a:round/>
+                      <a:headEnd type="none" w="med" len="med"/>
+                      <a:tailEnd type="none" w="med" len="med"/>
+                    </a:lnB>
+                    <a:solidFill>
+                      <a:schemeClr val="accent4"/>
+                    </a:solidFill>
+                  </a:tcPr>
+                </a:tc>
+                <a:tc>
+                  <a:txBody>
+                    <a:bodyPr/>
+                    <a:lstStyle/>
+                    <a:p>
+                      <a:pPr algn="ctr"/>
+                      <a:r>
+                        <a:rPr lang="en-US" sz="2400" dirty="0"/>
+                        <a:t>0</a:t>
+                      </a:r>
+                    </a:p>
+                  </a:txBody>
+                  <a:tcPr>
+                    <a:lnL w="12700" cap="flat" cmpd="sng" algn="ctr">
+                      <a:solidFill>
+                        <a:schemeClr val="tx1"/>
+                      </a:solidFill>
+                      <a:prstDash val="solid"/>
+                      <a:round/>
+                      <a:headEnd type="none" w="med" len="med"/>
+                      <a:tailEnd type="none" w="med" len="med"/>
+                    </a:lnL>
+                    <a:lnR w="12700" cap="flat" cmpd="sng" algn="ctr">
+                      <a:solidFill>
+                        <a:schemeClr val="tx1"/>
+                      </a:solidFill>
+                      <a:prstDash val="solid"/>
+                      <a:round/>
+                      <a:headEnd type="none" w="med" len="med"/>
+                      <a:tailEnd type="none" w="med" len="med"/>
+                    </a:lnR>
+                    <a:lnT w="12700" cap="flat" cmpd="sng" algn="ctr">
+                      <a:solidFill>
+                        <a:schemeClr val="tx1"/>
+                      </a:solidFill>
+                      <a:prstDash val="solid"/>
+                      <a:round/>
+                      <a:headEnd type="none" w="med" len="med"/>
+                      <a:tailEnd type="none" w="med" len="med"/>
+                    </a:lnT>
+                    <a:lnB w="12700" cap="flat" cmpd="sng" algn="ctr">
+                      <a:solidFill>
+                        <a:schemeClr val="tx1"/>
+                      </a:solidFill>
+                      <a:prstDash val="solid"/>
+                      <a:round/>
+                      <a:headEnd type="none" w="med" len="med"/>
+                      <a:tailEnd type="none" w="med" len="med"/>
+                    </a:lnB>
+                    <a:solidFill>
+                      <a:schemeClr val="accent4"/>
+                    </a:solidFill>
+                  </a:tcPr>
+                </a:tc>
+                <a:extLst>
+                  <a:ext uri="{0D108BD9-81ED-4DB2-BD59-A6C34878D82A}">
+                    <a16:rowId xmlns:a16="http://schemas.microsoft.com/office/drawing/2014/main" val="575531343"/>
+                  </a:ext>
+                </a:extLst>
+              </a:tr>
+              <a:tr h="370840">
+                <a:tc>
+                  <a:txBody>
+                    <a:bodyPr/>
+                    <a:lstStyle/>
+                    <a:p>
+                      <a:pPr algn="ctr"/>
+                      <a:r>
+                        <a:rPr lang="en-US" sz="2400" dirty="0"/>
+                        <a:t>1</a:t>
+                      </a:r>
+                    </a:p>
+                  </a:txBody>
+                  <a:tcPr>
+                    <a:lnL w="12700" cap="flat" cmpd="sng" algn="ctr">
+                      <a:solidFill>
+                        <a:schemeClr val="tx1"/>
+                      </a:solidFill>
+                      <a:prstDash val="solid"/>
+                      <a:round/>
+                      <a:headEnd type="none" w="med" len="med"/>
+                      <a:tailEnd type="none" w="med" len="med"/>
+                    </a:lnL>
+                    <a:lnR w="12700" cap="flat" cmpd="sng" algn="ctr">
+                      <a:solidFill>
+                        <a:schemeClr val="tx1"/>
+                      </a:solidFill>
+                      <a:prstDash val="solid"/>
+                      <a:round/>
+                      <a:headEnd type="none" w="med" len="med"/>
+                      <a:tailEnd type="none" w="med" len="med"/>
+                    </a:lnR>
+                    <a:lnT w="12700" cap="flat" cmpd="sng" algn="ctr">
+                      <a:solidFill>
+                        <a:schemeClr val="tx1"/>
+                      </a:solidFill>
+                      <a:prstDash val="solid"/>
+                      <a:round/>
+                      <a:headEnd type="none" w="med" len="med"/>
+                      <a:tailEnd type="none" w="med" len="med"/>
+                    </a:lnT>
+                    <a:lnB w="12700" cap="flat" cmpd="sng" algn="ctr">
+                      <a:solidFill>
+                        <a:schemeClr val="tx1"/>
+                      </a:solidFill>
+                      <a:prstDash val="solid"/>
+                      <a:round/>
+                      <a:headEnd type="none" w="med" len="med"/>
+                      <a:tailEnd type="none" w="med" len="med"/>
+                    </a:lnB>
+                    <a:solidFill>
+                      <a:schemeClr val="accent4"/>
+                    </a:solidFill>
+                  </a:tcPr>
+                </a:tc>
+                <a:tc>
+                  <a:txBody>
+                    <a:bodyPr/>
+                    <a:lstStyle/>
+                    <a:p>
+                      <a:pPr algn="ctr"/>
+                      <a:r>
+                        <a:rPr lang="en-US" sz="2400" dirty="0"/>
+                        <a:t>0</a:t>
+                      </a:r>
+                    </a:p>
+                  </a:txBody>
+                  <a:tcPr>
+                    <a:lnL w="12700" cap="flat" cmpd="sng" algn="ctr">
+                      <a:solidFill>
+                        <a:schemeClr val="tx1"/>
+                      </a:solidFill>
+                      <a:prstDash val="solid"/>
+                      <a:round/>
+                      <a:headEnd type="none" w="med" len="med"/>
+                      <a:tailEnd type="none" w="med" len="med"/>
+                    </a:lnL>
+                    <a:lnR w="12700" cap="flat" cmpd="sng" algn="ctr">
+                      <a:solidFill>
+                        <a:schemeClr val="tx1"/>
+                      </a:solidFill>
+                      <a:prstDash val="solid"/>
+                      <a:round/>
+                      <a:headEnd type="none" w="med" len="med"/>
+                      <a:tailEnd type="none" w="med" len="med"/>
+                    </a:lnR>
+                    <a:lnT w="12700" cap="flat" cmpd="sng" algn="ctr">
+                      <a:solidFill>
+                        <a:schemeClr val="tx1"/>
+                      </a:solidFill>
+                      <a:prstDash val="solid"/>
+                      <a:round/>
+                      <a:headEnd type="none" w="med" len="med"/>
+                      <a:tailEnd type="none" w="med" len="med"/>
+                    </a:lnT>
+                    <a:lnB w="12700" cap="flat" cmpd="sng" algn="ctr">
+                      <a:solidFill>
+                        <a:schemeClr val="tx1"/>
+                      </a:solidFill>
+                      <a:prstDash val="solid"/>
+                      <a:round/>
+                      <a:headEnd type="none" w="med" len="med"/>
+                      <a:tailEnd type="none" w="med" len="med"/>
+                    </a:lnB>
+                    <a:solidFill>
+                      <a:schemeClr val="accent4"/>
+                    </a:solidFill>
+                  </a:tcPr>
+                </a:tc>
+                <a:tc>
+                  <a:txBody>
+                    <a:bodyPr/>
+                    <a:lstStyle/>
+                    <a:p>
+                      <a:pPr algn="ctr"/>
+                      <a:r>
+                        <a:rPr lang="en-US" sz="2400" dirty="0"/>
+                        <a:t>1</a:t>
+                      </a:r>
+                    </a:p>
+                  </a:txBody>
+                  <a:tcPr>
+                    <a:lnL w="12700" cap="flat" cmpd="sng" algn="ctr">
+                      <a:solidFill>
+                        <a:schemeClr val="tx1"/>
+                      </a:solidFill>
+                      <a:prstDash val="solid"/>
+                      <a:round/>
+                      <a:headEnd type="none" w="med" len="med"/>
+                      <a:tailEnd type="none" w="med" len="med"/>
+                    </a:lnL>
+                    <a:lnR w="12700" cap="flat" cmpd="sng" algn="ctr">
+                      <a:solidFill>
+                        <a:schemeClr val="tx1"/>
+                      </a:solidFill>
+                      <a:prstDash val="solid"/>
+                      <a:round/>
+                      <a:headEnd type="none" w="med" len="med"/>
+                      <a:tailEnd type="none" w="med" len="med"/>
+                    </a:lnR>
+                    <a:lnT w="12700" cap="flat" cmpd="sng" algn="ctr">
+                      <a:solidFill>
+                        <a:schemeClr val="tx1"/>
+                      </a:solidFill>
+                      <a:prstDash val="solid"/>
+                      <a:round/>
+                      <a:headEnd type="none" w="med" len="med"/>
+                      <a:tailEnd type="none" w="med" len="med"/>
+                    </a:lnT>
+                    <a:lnB w="12700" cap="flat" cmpd="sng" algn="ctr">
+                      <a:solidFill>
+                        <a:schemeClr val="tx1"/>
+                      </a:solidFill>
+                      <a:prstDash val="solid"/>
+                      <a:round/>
+                      <a:headEnd type="none" w="med" len="med"/>
+                      <a:tailEnd type="none" w="med" len="med"/>
+                    </a:lnB>
+                    <a:solidFill>
+                      <a:schemeClr val="accent4"/>
+                    </a:solidFill>
+                  </a:tcPr>
+                </a:tc>
+                <a:extLst>
+                  <a:ext uri="{0D108BD9-81ED-4DB2-BD59-A6C34878D82A}">
+                    <a16:rowId xmlns:a16="http://schemas.microsoft.com/office/drawing/2014/main" val="832051733"/>
+                  </a:ext>
+                </a:extLst>
+              </a:tr>
+            </a:tbl>
+          </a:graphicData>
+        </a:graphic>
+      </p:graphicFrame>
+      <p:sp>
+        <p:nvSpPr>
+          <p:cNvPr id="7" name="ZoneTexte 6">
+            <a:extLst>
+              <a:ext uri="{FF2B5EF4-FFF2-40B4-BE49-F238E27FC236}">
+                <a16:creationId xmlns:a16="http://schemas.microsoft.com/office/drawing/2014/main" id="{DF7F9F3A-D57F-45CB-AE49-49E7E1747AFC}"/>
+              </a:ext>
+            </a:extLst>
+          </p:cNvPr>
+          <p:cNvSpPr txBox="1"/>
+          <p:nvPr/>
+        </p:nvSpPr>
+        <p:spPr>
+          <a:xfrm>
+            <a:off x="3396793" y="5260015"/>
+            <a:ext cx="2036190" cy="369332"/>
+          </a:xfrm>
+          <a:prstGeom prst="rect">
+            <a:avLst/>
+          </a:prstGeom>
+          <a:noFill/>
+        </p:spPr>
+        <p:txBody>
+          <a:bodyPr wrap="square" rtlCol="0">
+            <a:spAutoFit/>
+          </a:bodyPr>
+          <a:lstStyle/>
+          <a:p>
+            <a:pPr algn="ctr"/>
+            <a:r>
+              <a:rPr lang="en-US" dirty="0"/>
+              <a:t>Convolutional filter</a:t>
+            </a:r>
           </a:p>
         </p:txBody>
       </p:sp>
     </p:spTree>
     <p:extLst>
       <p:ext uri="{BB962C8B-B14F-4D97-AF65-F5344CB8AC3E}">
-        <p14:creationId xmlns:p14="http://schemas.microsoft.com/office/powerpoint/2010/main" val="4089647688"/>
+        <p14:creationId xmlns:p14="http://schemas.microsoft.com/office/powerpoint/2010/main" val="4058459287"/>
       </p:ext>
     </p:extLst>
   </p:cSld>
@@ -2271,7 +3834,7 @@
           <p:cNvPr id="2" name="Titre 1">
             <a:extLst>
               <a:ext uri="{FF2B5EF4-FFF2-40B4-BE49-F238E27FC236}">
-                <a16:creationId xmlns:a16="http://schemas.microsoft.com/office/drawing/2014/main" id="{C1DD926E-FAC8-4AD3-9A9E-265980DA1B6B}"/>
+                <a16:creationId xmlns:a16="http://schemas.microsoft.com/office/drawing/2014/main" id="{3E7DCBEF-003E-4C35-9462-F0CE635D6199}"/>
               </a:ext>
             </a:extLst>
           </p:cNvPr>
@@ -2289,7 +3852,7 @@
           <a:p>
             <a:r>
               <a:rPr lang="en-US" dirty="0"/>
-              <a:t>CNNs for time series analysis</a:t>
+              <a:t>Convolution</a:t>
             </a:r>
           </a:p>
         </p:txBody>
@@ -2299,7 +3862,7 @@
           <p:cNvPr id="3" name="Espace réservé du texte 2">
             <a:extLst>
               <a:ext uri="{FF2B5EF4-FFF2-40B4-BE49-F238E27FC236}">
-                <a16:creationId xmlns:a16="http://schemas.microsoft.com/office/drawing/2014/main" id="{A7341B50-8ADE-4F13-85BD-C1FE2833C2DA}"/>
+                <a16:creationId xmlns:a16="http://schemas.microsoft.com/office/drawing/2014/main" id="{A6305F70-9D82-4D68-8CE9-F879CBDEFEBD}"/>
               </a:ext>
             </a:extLst>
           </p:cNvPr>
@@ -2317,65 +3880,86 @@
           <a:p>
             <a:r>
               <a:rPr lang="en-US" dirty="0"/>
-              <a:t>But actually, CNN perform </a:t>
+              <a:t>Convolutional filters</a:t>
+            </a:r>
+          </a:p>
+          <a:p>
+            <a:pPr lvl="1"/>
+            <a:r>
+              <a:rPr lang="en-US" dirty="0"/>
+              <a:t>Learn patterns by adjusting weights</a:t>
+            </a:r>
+          </a:p>
+          <a:p>
+            <a:pPr lvl="1"/>
+            <a:r>
+              <a:rPr lang="en-US" dirty="0"/>
+              <a:t>The patterns can appear </a:t>
             </a:r>
             <a:r>
               <a:rPr lang="en-US" b="1" dirty="0"/>
-              <a:t>automatic feature construction</a:t>
-            </a:r>
-          </a:p>
-          <a:p>
-            <a:r>
-              <a:rPr lang="en-US" dirty="0"/>
-              <a:t>There are alternatives, using expert-designed features</a:t>
-            </a:r>
-          </a:p>
-          <a:p>
-            <a:r>
-              <a:rPr lang="en-US" dirty="0"/>
-              <a:t>For example, python library </a:t>
-            </a:r>
-            <a:r>
-              <a:rPr lang="en-US" b="1" dirty="0" err="1"/>
-              <a:t>tsfresh</a:t>
-            </a:r>
+              <a:t>everywhere</a:t>
+            </a:r>
+            <a:r>
+              <a:rPr lang="en-US" dirty="0"/>
+              <a:t> in the image</a:t>
+            </a:r>
+          </a:p>
+          <a:p>
+            <a:pPr lvl="1"/>
+            <a:r>
+              <a:rPr lang="en-US" dirty="0"/>
+              <a:t>Convolutional operation can be applied in </a:t>
+            </a:r>
+            <a:r>
+              <a:rPr lang="en-US" b="1" dirty="0"/>
+              <a:t>parallel</a:t>
+            </a:r>
+          </a:p>
+          <a:p>
             <a:endParaRPr lang="en-US" b="1" dirty="0"/>
           </a:p>
           <a:p>
+            <a:r>
+              <a:rPr lang="en-US" dirty="0"/>
+              <a:t>Still, it is not completely free: hyperparameters!</a:t>
+            </a:r>
+          </a:p>
+          <a:p>
             <a:pPr lvl="1"/>
             <a:r>
               <a:rPr lang="en-US" dirty="0"/>
-              <a:t>Transform the dynamic problem into a series of static features</a:t>
+              <a:t>Size of the convolutional window (sometimes called </a:t>
+            </a:r>
+            <a:r>
+              <a:rPr lang="en-US" b="1" dirty="0"/>
+              <a:t>kernel</a:t>
+            </a:r>
+            <a:r>
+              <a:rPr lang="en-US" dirty="0"/>
+              <a:t>)</a:t>
             </a:r>
           </a:p>
           <a:p>
             <a:pPr lvl="1"/>
             <a:r>
-              <a:rPr lang="en-US" dirty="0"/>
-              <a:t>This is </a:t>
-            </a:r>
-            <a:r>
-              <a:rPr lang="en-US" i="1" dirty="0"/>
-              <a:t>tabular data</a:t>
-            </a:r>
-            <a:r>
-              <a:rPr lang="en-US" dirty="0"/>
-              <a:t>! Apply classic ML algorithms</a:t>
+              <a:rPr lang="en-US" b="1" dirty="0"/>
+              <a:t>Stride</a:t>
+            </a:r>
+            <a:r>
+              <a:rPr lang="en-US" dirty="0"/>
+              <a:t>, how often to apply the window)</a:t>
             </a:r>
           </a:p>
           <a:p>
             <a:pPr lvl="1"/>
             <a:r>
-              <a:rPr lang="en-US" dirty="0"/>
-              <a:t>Works decently for classification</a:t>
-            </a:r>
-            <a:r>
-              <a:rPr lang="en-US"/>
-              <a:t>, not so much </a:t>
-            </a:r>
-            <a:r>
-              <a:rPr lang="en-US" dirty="0"/>
-              <a:t>for forecasting</a:t>
+              <a:rPr lang="en-US" b="1" dirty="0"/>
+              <a:t>Padding</a:t>
+            </a:r>
+            <a:r>
+              <a:rPr lang="en-US" dirty="0"/>
+              <a:t>, apply window even in the corners</a:t>
             </a:r>
           </a:p>
         </p:txBody>
@@ -2383,7 +3967,519 @@
     </p:spTree>
     <p:extLst>
       <p:ext uri="{BB962C8B-B14F-4D97-AF65-F5344CB8AC3E}">
-        <p14:creationId xmlns:p14="http://schemas.microsoft.com/office/powerpoint/2010/main" val="1691799692"/>
+        <p14:creationId xmlns:p14="http://schemas.microsoft.com/office/powerpoint/2010/main" val="2085220214"/>
+      </p:ext>
+    </p:extLst>
+  </p:cSld>
+  <p:clrMapOvr>
+    <a:masterClrMapping/>
+  </p:clrMapOvr>
+</p:sld>
+</file>
+
+<file path=ppt/slides/slide7.xml><?xml version="1.0" encoding="utf-8"?>
+<p:sld xmlns:a="http://schemas.openxmlformats.org/drawingml/2006/main" xmlns:r="http://schemas.openxmlformats.org/officeDocument/2006/relationships" xmlns:p="http://schemas.openxmlformats.org/presentationml/2006/main">
+  <p:cSld>
+    <p:spTree>
+      <p:nvGrpSpPr>
+        <p:cNvPr id="1" name=""/>
+        <p:cNvGrpSpPr/>
+        <p:nvPr/>
+      </p:nvGrpSpPr>
+      <p:grpSpPr>
+        <a:xfrm>
+          <a:off x="0" y="0"/>
+          <a:ext cx="0" cy="0"/>
+          <a:chOff x="0" y="0"/>
+          <a:chExt cx="0" cy="0"/>
+        </a:xfrm>
+      </p:grpSpPr>
+      <p:sp>
+        <p:nvSpPr>
+          <p:cNvPr id="2" name="Titre 1">
+            <a:extLst>
+              <a:ext uri="{FF2B5EF4-FFF2-40B4-BE49-F238E27FC236}">
+                <a16:creationId xmlns:a16="http://schemas.microsoft.com/office/drawing/2014/main" id="{8C7FF886-61D3-486A-96F8-7B656F548C16}"/>
+              </a:ext>
+            </a:extLst>
+          </p:cNvPr>
+          <p:cNvSpPr>
+            <a:spLocks noGrp="1"/>
+          </p:cNvSpPr>
+          <p:nvPr>
+            <p:ph type="title"/>
+          </p:nvPr>
+        </p:nvSpPr>
+        <p:spPr/>
+        <p:txBody>
+          <a:bodyPr/>
+          <a:lstStyle/>
+          <a:p>
+            <a:r>
+              <a:rPr lang="en-US" dirty="0"/>
+              <a:t>Padding</a:t>
+            </a:r>
+          </a:p>
+        </p:txBody>
+      </p:sp>
+      <p:sp>
+        <p:nvSpPr>
+          <p:cNvPr id="3" name="Espace réservé du texte 2">
+            <a:extLst>
+              <a:ext uri="{FF2B5EF4-FFF2-40B4-BE49-F238E27FC236}">
+                <a16:creationId xmlns:a16="http://schemas.microsoft.com/office/drawing/2014/main" id="{F7C15EE3-5D97-4C6B-93CA-6F7548DCF777}"/>
+              </a:ext>
+            </a:extLst>
+          </p:cNvPr>
+          <p:cNvSpPr>
+            <a:spLocks noGrp="1"/>
+          </p:cNvSpPr>
+          <p:nvPr>
+            <p:ph type="body" sz="quarter" idx="10"/>
+          </p:nvPr>
+        </p:nvSpPr>
+        <p:spPr/>
+        <p:txBody>
+          <a:bodyPr/>
+          <a:lstStyle/>
+          <a:p>
+            <a:endParaRPr lang="en-US" dirty="0"/>
+          </a:p>
+        </p:txBody>
+      </p:sp>
+      <p:pic>
+        <p:nvPicPr>
+          <p:cNvPr id="1026" name="Picture 2" descr="An Introduction to different Types of Convolutions in Deep Learning | by  Paul-Louis Pröve | Towards Data Science">
+            <a:extLst>
+              <a:ext uri="{FF2B5EF4-FFF2-40B4-BE49-F238E27FC236}">
+                <a16:creationId xmlns:a16="http://schemas.microsoft.com/office/drawing/2014/main" id="{54AC5589-8286-49A6-8BE2-E78E5A69F7D0}"/>
+              </a:ext>
+            </a:extLst>
+          </p:cNvPr>
+          <p:cNvPicPr>
+            <a:picLocks noChangeAspect="1" noChangeArrowheads="1" noCrop="1"/>
+          </p:cNvPicPr>
+          <p:nvPr/>
+        </p:nvPicPr>
+        <p:blipFill>
+          <a:blip r:embed="rId2">
+            <a:extLst>
+              <a:ext uri="{28A0092B-C50C-407E-A947-70E740481C1C}">
+                <a14:useLocalDpi xmlns:a14="http://schemas.microsoft.com/office/drawing/2010/main" val="0"/>
+              </a:ext>
+            </a:extLst>
+          </a:blip>
+          <a:srcRect/>
+          <a:stretch>
+            <a:fillRect/>
+          </a:stretch>
+        </p:blipFill>
+        <p:spPr bwMode="auto">
+          <a:xfrm>
+            <a:off x="7591425" y="1622903"/>
+            <a:ext cx="3762375" cy="4276725"/>
+          </a:xfrm>
+          <a:prstGeom prst="rect">
+            <a:avLst/>
+          </a:prstGeom>
+          <a:noFill/>
+          <a:extLst>
+            <a:ext uri="{909E8E84-426E-40DD-AFC4-6F175D3DCCD1}">
+              <a14:hiddenFill xmlns:a14="http://schemas.microsoft.com/office/drawing/2010/main">
+                <a:solidFill>
+                  <a:srgbClr val="FFFFFF"/>
+                </a:solidFill>
+              </a14:hiddenFill>
+            </a:ext>
+          </a:extLst>
+        </p:spPr>
+      </p:pic>
+      <p:pic>
+        <p:nvPicPr>
+          <p:cNvPr id="1028" name="Picture 4" descr="What is “padding” in Convolutional Neural Network?">
+            <a:extLst>
+              <a:ext uri="{FF2B5EF4-FFF2-40B4-BE49-F238E27FC236}">
+                <a16:creationId xmlns:a16="http://schemas.microsoft.com/office/drawing/2014/main" id="{1AD1EFA5-4D2D-40FF-AB01-CCB17132C336}"/>
+              </a:ext>
+            </a:extLst>
+          </p:cNvPr>
+          <p:cNvPicPr>
+            <a:picLocks noChangeAspect="1" noChangeArrowheads="1"/>
+          </p:cNvPicPr>
+          <p:nvPr/>
+        </p:nvPicPr>
+        <p:blipFill>
+          <a:blip r:embed="rId3">
+            <a:extLst>
+              <a:ext uri="{28A0092B-C50C-407E-A947-70E740481C1C}">
+                <a14:useLocalDpi xmlns:a14="http://schemas.microsoft.com/office/drawing/2010/main" val="0"/>
+              </a:ext>
+            </a:extLst>
+          </a:blip>
+          <a:srcRect/>
+          <a:stretch>
+            <a:fillRect/>
+          </a:stretch>
+        </p:blipFill>
+        <p:spPr bwMode="auto">
+          <a:xfrm>
+            <a:off x="517688" y="2364736"/>
+            <a:ext cx="6167294" cy="3192152"/>
+          </a:xfrm>
+          <a:prstGeom prst="rect">
+            <a:avLst/>
+          </a:prstGeom>
+          <a:noFill/>
+          <a:extLst>
+            <a:ext uri="{909E8E84-426E-40DD-AFC4-6F175D3DCCD1}">
+              <a14:hiddenFill xmlns:a14="http://schemas.microsoft.com/office/drawing/2010/main">
+                <a:solidFill>
+                  <a:srgbClr val="FFFFFF"/>
+                </a:solidFill>
+              </a14:hiddenFill>
+            </a:ext>
+          </a:extLst>
+        </p:spPr>
+      </p:pic>
+    </p:spTree>
+    <p:extLst>
+      <p:ext uri="{BB962C8B-B14F-4D97-AF65-F5344CB8AC3E}">
+        <p14:creationId xmlns:p14="http://schemas.microsoft.com/office/powerpoint/2010/main" val="798102881"/>
+      </p:ext>
+    </p:extLst>
+  </p:cSld>
+  <p:clrMapOvr>
+    <a:masterClrMapping/>
+  </p:clrMapOvr>
+</p:sld>
+</file>
+
+<file path=ppt/slides/slide8.xml><?xml version="1.0" encoding="utf-8"?>
+<p:sld xmlns:a="http://schemas.openxmlformats.org/drawingml/2006/main" xmlns:r="http://schemas.openxmlformats.org/officeDocument/2006/relationships" xmlns:p="http://schemas.openxmlformats.org/presentationml/2006/main">
+  <p:cSld>
+    <p:spTree>
+      <p:nvGrpSpPr>
+        <p:cNvPr id="1" name=""/>
+        <p:cNvGrpSpPr/>
+        <p:nvPr/>
+      </p:nvGrpSpPr>
+      <p:grpSpPr>
+        <a:xfrm>
+          <a:off x="0" y="0"/>
+          <a:ext cx="0" cy="0"/>
+          <a:chOff x="0" y="0"/>
+          <a:chExt cx="0" cy="0"/>
+        </a:xfrm>
+      </p:grpSpPr>
+      <p:sp>
+        <p:nvSpPr>
+          <p:cNvPr id="2" name="Titre 1">
+            <a:extLst>
+              <a:ext uri="{FF2B5EF4-FFF2-40B4-BE49-F238E27FC236}">
+                <a16:creationId xmlns:a16="http://schemas.microsoft.com/office/drawing/2014/main" id="{53C68F15-0569-4E09-BA4D-205E4170A8E2}"/>
+              </a:ext>
+            </a:extLst>
+          </p:cNvPr>
+          <p:cNvSpPr>
+            <a:spLocks noGrp="1"/>
+          </p:cNvSpPr>
+          <p:nvPr>
+            <p:ph type="title"/>
+          </p:nvPr>
+        </p:nvSpPr>
+        <p:spPr/>
+        <p:txBody>
+          <a:bodyPr/>
+          <a:lstStyle/>
+          <a:p>
+            <a:r>
+              <a:rPr lang="en-US" dirty="0"/>
+              <a:t>Pooling (or </a:t>
+            </a:r>
+            <a:r>
+              <a:rPr lang="en-US" dirty="0" err="1"/>
+              <a:t>Downsampling</a:t>
+            </a:r>
+            <a:r>
+              <a:rPr lang="en-US" dirty="0"/>
+              <a:t>)</a:t>
+            </a:r>
+          </a:p>
+        </p:txBody>
+      </p:sp>
+      <p:sp>
+        <p:nvSpPr>
+          <p:cNvPr id="3" name="Espace réservé du texte 2">
+            <a:extLst>
+              <a:ext uri="{FF2B5EF4-FFF2-40B4-BE49-F238E27FC236}">
+                <a16:creationId xmlns:a16="http://schemas.microsoft.com/office/drawing/2014/main" id="{CDA3C489-9E13-43D7-B718-18322D7A2345}"/>
+              </a:ext>
+            </a:extLst>
+          </p:cNvPr>
+          <p:cNvSpPr>
+            <a:spLocks noGrp="1"/>
+          </p:cNvSpPr>
+          <p:nvPr>
+            <p:ph type="body" sz="quarter" idx="10"/>
+          </p:nvPr>
+        </p:nvSpPr>
+        <p:spPr/>
+        <p:txBody>
+          <a:bodyPr/>
+          <a:lstStyle/>
+          <a:p>
+            <a:r>
+              <a:rPr lang="en-US" dirty="0"/>
+              <a:t>After sending result of the convolution through </a:t>
+            </a:r>
+            <a:r>
+              <a:rPr lang="en-US" b="1" dirty="0"/>
+              <a:t>activation</a:t>
+            </a:r>
+          </a:p>
+          <a:p>
+            <a:pPr lvl="1"/>
+            <a:r>
+              <a:rPr lang="en-US" dirty="0"/>
+              <a:t>Pick the highest resulting value in a small grid applied to image</a:t>
+            </a:r>
+          </a:p>
+          <a:p>
+            <a:pPr lvl="1"/>
+            <a:r>
+              <a:rPr lang="en-US" dirty="0"/>
+              <a:t>Idea: only pick the most important features created by filters</a:t>
+            </a:r>
+          </a:p>
+        </p:txBody>
+      </p:sp>
+      <p:pic>
+        <p:nvPicPr>
+          <p:cNvPr id="2050" name="Picture 2" descr="Max Pooling Explained | Papers With Code">
+            <a:extLst>
+              <a:ext uri="{FF2B5EF4-FFF2-40B4-BE49-F238E27FC236}">
+                <a16:creationId xmlns:a16="http://schemas.microsoft.com/office/drawing/2014/main" id="{0F405166-435F-49C5-918D-9429BD80D3E6}"/>
+              </a:ext>
+            </a:extLst>
+          </p:cNvPr>
+          <p:cNvPicPr>
+            <a:picLocks noChangeAspect="1" noChangeArrowheads="1"/>
+          </p:cNvPicPr>
+          <p:nvPr/>
+        </p:nvPicPr>
+        <p:blipFill>
+          <a:blip r:embed="rId2">
+            <a:extLst>
+              <a:ext uri="{28A0092B-C50C-407E-A947-70E740481C1C}">
+                <a14:useLocalDpi xmlns:a14="http://schemas.microsoft.com/office/drawing/2010/main" val="0"/>
+              </a:ext>
+            </a:extLst>
+          </a:blip>
+          <a:srcRect/>
+          <a:stretch>
+            <a:fillRect/>
+          </a:stretch>
+        </p:blipFill>
+        <p:spPr bwMode="auto">
+          <a:xfrm>
+            <a:off x="802163" y="3300763"/>
+            <a:ext cx="5293837" cy="2209295"/>
+          </a:xfrm>
+          <a:prstGeom prst="rect">
+            <a:avLst/>
+          </a:prstGeom>
+          <a:noFill/>
+          <a:extLst>
+            <a:ext uri="{909E8E84-426E-40DD-AFC4-6F175D3DCCD1}">
+              <a14:hiddenFill xmlns:a14="http://schemas.microsoft.com/office/drawing/2010/main">
+                <a:solidFill>
+                  <a:srgbClr val="FFFFFF"/>
+                </a:solidFill>
+              </a14:hiddenFill>
+            </a:ext>
+          </a:extLst>
+        </p:spPr>
+      </p:pic>
+      <p:pic>
+        <p:nvPicPr>
+          <p:cNvPr id="2052" name="Picture 4" descr="Pooling In Convolutional Neural Networks">
+            <a:extLst>
+              <a:ext uri="{FF2B5EF4-FFF2-40B4-BE49-F238E27FC236}">
+                <a16:creationId xmlns:a16="http://schemas.microsoft.com/office/drawing/2014/main" id="{49878F9E-CA40-48E7-A8CC-304EB30EB73E}"/>
+              </a:ext>
+            </a:extLst>
+          </p:cNvPr>
+          <p:cNvPicPr>
+            <a:picLocks noChangeAspect="1" noChangeArrowheads="1"/>
+          </p:cNvPicPr>
+          <p:nvPr/>
+        </p:nvPicPr>
+        <p:blipFill rotWithShape="1">
+          <a:blip r:embed="rId3" cstate="print">
+            <a:extLst>
+              <a:ext uri="{28A0092B-C50C-407E-A947-70E740481C1C}">
+                <a14:useLocalDpi xmlns:a14="http://schemas.microsoft.com/office/drawing/2010/main" val="0"/>
+              </a:ext>
+            </a:extLst>
+          </a:blip>
+          <a:srcRect l="10380" r="8058"/>
+          <a:stretch/>
+        </p:blipFill>
+        <p:spPr bwMode="auto">
+          <a:xfrm>
+            <a:off x="6488585" y="3300763"/>
+            <a:ext cx="5398615" cy="2140842"/>
+          </a:xfrm>
+          <a:prstGeom prst="rect">
+            <a:avLst/>
+          </a:prstGeom>
+          <a:noFill/>
+          <a:extLst>
+            <a:ext uri="{909E8E84-426E-40DD-AFC4-6F175D3DCCD1}">
+              <a14:hiddenFill xmlns:a14="http://schemas.microsoft.com/office/drawing/2010/main">
+                <a:solidFill>
+                  <a:srgbClr val="FFFFFF"/>
+                </a:solidFill>
+              </a14:hiddenFill>
+            </a:ext>
+          </a:extLst>
+        </p:spPr>
+      </p:pic>
+    </p:spTree>
+    <p:extLst>
+      <p:ext uri="{BB962C8B-B14F-4D97-AF65-F5344CB8AC3E}">
+        <p14:creationId xmlns:p14="http://schemas.microsoft.com/office/powerpoint/2010/main" val="1725700376"/>
+      </p:ext>
+    </p:extLst>
+  </p:cSld>
+  <p:clrMapOvr>
+    <a:masterClrMapping/>
+  </p:clrMapOvr>
+</p:sld>
+</file>
+
+<file path=ppt/slides/slide9.xml><?xml version="1.0" encoding="utf-8"?>
+<p:sld xmlns:a="http://schemas.openxmlformats.org/drawingml/2006/main" xmlns:r="http://schemas.openxmlformats.org/officeDocument/2006/relationships" xmlns:p="http://schemas.openxmlformats.org/presentationml/2006/main">
+  <p:cSld>
+    <p:spTree>
+      <p:nvGrpSpPr>
+        <p:cNvPr id="1" name=""/>
+        <p:cNvGrpSpPr/>
+        <p:nvPr/>
+      </p:nvGrpSpPr>
+      <p:grpSpPr>
+        <a:xfrm>
+          <a:off x="0" y="0"/>
+          <a:ext cx="0" cy="0"/>
+          <a:chOff x="0" y="0"/>
+          <a:chExt cx="0" cy="0"/>
+        </a:xfrm>
+      </p:grpSpPr>
+      <p:sp>
+        <p:nvSpPr>
+          <p:cNvPr id="2" name="Titre 1">
+            <a:extLst>
+              <a:ext uri="{FF2B5EF4-FFF2-40B4-BE49-F238E27FC236}">
+                <a16:creationId xmlns:a16="http://schemas.microsoft.com/office/drawing/2014/main" id="{53C68F15-0569-4E09-BA4D-205E4170A8E2}"/>
+              </a:ext>
+            </a:extLst>
+          </p:cNvPr>
+          <p:cNvSpPr>
+            <a:spLocks noGrp="1"/>
+          </p:cNvSpPr>
+          <p:nvPr>
+            <p:ph type="title"/>
+          </p:nvPr>
+        </p:nvSpPr>
+        <p:spPr/>
+        <p:txBody>
+          <a:bodyPr/>
+          <a:lstStyle/>
+          <a:p>
+            <a:r>
+              <a:rPr lang="en-US" dirty="0"/>
+              <a:t>Pooling (or </a:t>
+            </a:r>
+            <a:r>
+              <a:rPr lang="en-US" dirty="0" err="1"/>
+              <a:t>Downsampling</a:t>
+            </a:r>
+            <a:r>
+              <a:rPr lang="en-US" dirty="0"/>
+              <a:t>)</a:t>
+            </a:r>
+          </a:p>
+        </p:txBody>
+      </p:sp>
+      <p:sp>
+        <p:nvSpPr>
+          <p:cNvPr id="3" name="Espace réservé du texte 2">
+            <a:extLst>
+              <a:ext uri="{FF2B5EF4-FFF2-40B4-BE49-F238E27FC236}">
+                <a16:creationId xmlns:a16="http://schemas.microsoft.com/office/drawing/2014/main" id="{CDA3C489-9E13-43D7-B718-18322D7A2345}"/>
+              </a:ext>
+            </a:extLst>
+          </p:cNvPr>
+          <p:cNvSpPr>
+            <a:spLocks noGrp="1"/>
+          </p:cNvSpPr>
+          <p:nvPr>
+            <p:ph type="body" sz="quarter" idx="10"/>
+          </p:nvPr>
+        </p:nvSpPr>
+        <p:spPr/>
+        <p:txBody>
+          <a:bodyPr/>
+          <a:lstStyle/>
+          <a:p>
+            <a:r>
+              <a:rPr lang="en-US" dirty="0"/>
+              <a:t>Different possible choices of pooling</a:t>
+            </a:r>
+          </a:p>
+          <a:p>
+            <a:pPr lvl="1"/>
+            <a:r>
+              <a:rPr lang="en-US" dirty="0"/>
+              <a:t>Get the highest value in window (</a:t>
+            </a:r>
+            <a:r>
+              <a:rPr lang="en-US" dirty="0" err="1"/>
+              <a:t>MaxPool</a:t>
+            </a:r>
+            <a:r>
+              <a:rPr lang="en-US" dirty="0"/>
+              <a:t>)</a:t>
+            </a:r>
+          </a:p>
+          <a:p>
+            <a:pPr lvl="1"/>
+            <a:r>
+              <a:rPr lang="en-US" dirty="0"/>
+              <a:t>Average over values in window (</a:t>
+            </a:r>
+            <a:r>
+              <a:rPr lang="en-US" dirty="0" err="1"/>
+              <a:t>AvgPool</a:t>
+            </a:r>
+            <a:r>
+              <a:rPr lang="en-US" dirty="0"/>
+              <a:t>)</a:t>
+            </a:r>
+          </a:p>
+          <a:p>
+            <a:pPr lvl="1"/>
+            <a:r>
+              <a:rPr lang="en-US" dirty="0"/>
+              <a:t>…</a:t>
+            </a:r>
+          </a:p>
+        </p:txBody>
+      </p:sp>
+    </p:spTree>
+    <p:extLst>
+      <p:ext uri="{BB962C8B-B14F-4D97-AF65-F5344CB8AC3E}">
+        <p14:creationId xmlns:p14="http://schemas.microsoft.com/office/powerpoint/2010/main" val="2593618649"/>
       </p:ext>
     </p:extLst>
   </p:cSld>

</xml_diff>